<commit_message>
done with the predemo presentation
</commit_message>
<xml_diff>
--- a/STD Infection in USA capstone.pptx
+++ b/STD Infection in USA capstone.pptx
@@ -6479,7 +6479,7 @@
           <a:p>
             <a:fld id="{044029A6-CD3A-492B-AB46-43FBF5BF89AA}" type="datetimeFigureOut">
               <a:rPr lang="en-US" smtClean="0"/>
-              <a:t>6/27/2021</a:t>
+              <a:t>6/28/2021</a:t>
             </a:fld>
             <a:endParaRPr lang="en-US"/>
           </a:p>
@@ -6677,7 +6677,7 @@
           <a:p>
             <a:fld id="{044029A6-CD3A-492B-AB46-43FBF5BF89AA}" type="datetimeFigureOut">
               <a:rPr lang="en-US" smtClean="0"/>
-              <a:t>6/27/2021</a:t>
+              <a:t>6/28/2021</a:t>
             </a:fld>
             <a:endParaRPr lang="en-US"/>
           </a:p>
@@ -6885,7 +6885,7 @@
           <a:p>
             <a:fld id="{044029A6-CD3A-492B-AB46-43FBF5BF89AA}" type="datetimeFigureOut">
               <a:rPr lang="en-US" smtClean="0"/>
-              <a:t>6/27/2021</a:t>
+              <a:t>6/28/2021</a:t>
             </a:fld>
             <a:endParaRPr lang="en-US"/>
           </a:p>
@@ -7083,7 +7083,7 @@
           <a:p>
             <a:fld id="{044029A6-CD3A-492B-AB46-43FBF5BF89AA}" type="datetimeFigureOut">
               <a:rPr lang="en-US" smtClean="0"/>
-              <a:t>6/27/2021</a:t>
+              <a:t>6/28/2021</a:t>
             </a:fld>
             <a:endParaRPr lang="en-US"/>
           </a:p>
@@ -7358,7 +7358,7 @@
           <a:p>
             <a:fld id="{044029A6-CD3A-492B-AB46-43FBF5BF89AA}" type="datetimeFigureOut">
               <a:rPr lang="en-US" smtClean="0"/>
-              <a:t>6/27/2021</a:t>
+              <a:t>6/28/2021</a:t>
             </a:fld>
             <a:endParaRPr lang="en-US"/>
           </a:p>
@@ -7623,7 +7623,7 @@
           <a:p>
             <a:fld id="{044029A6-CD3A-492B-AB46-43FBF5BF89AA}" type="datetimeFigureOut">
               <a:rPr lang="en-US" smtClean="0"/>
-              <a:t>6/27/2021</a:t>
+              <a:t>6/28/2021</a:t>
             </a:fld>
             <a:endParaRPr lang="en-US"/>
           </a:p>
@@ -8035,7 +8035,7 @@
           <a:p>
             <a:fld id="{044029A6-CD3A-492B-AB46-43FBF5BF89AA}" type="datetimeFigureOut">
               <a:rPr lang="en-US" smtClean="0"/>
-              <a:t>6/27/2021</a:t>
+              <a:t>6/28/2021</a:t>
             </a:fld>
             <a:endParaRPr lang="en-US"/>
           </a:p>
@@ -8176,7 +8176,7 @@
           <a:p>
             <a:fld id="{044029A6-CD3A-492B-AB46-43FBF5BF89AA}" type="datetimeFigureOut">
               <a:rPr lang="en-US" smtClean="0"/>
-              <a:t>6/27/2021</a:t>
+              <a:t>6/28/2021</a:t>
             </a:fld>
             <a:endParaRPr lang="en-US"/>
           </a:p>
@@ -8289,7 +8289,7 @@
           <a:p>
             <a:fld id="{044029A6-CD3A-492B-AB46-43FBF5BF89AA}" type="datetimeFigureOut">
               <a:rPr lang="en-US" smtClean="0"/>
-              <a:t>6/27/2021</a:t>
+              <a:t>6/28/2021</a:t>
             </a:fld>
             <a:endParaRPr lang="en-US"/>
           </a:p>
@@ -8600,7 +8600,7 @@
           <a:p>
             <a:fld id="{044029A6-CD3A-492B-AB46-43FBF5BF89AA}" type="datetimeFigureOut">
               <a:rPr lang="en-US" smtClean="0"/>
-              <a:t>6/27/2021</a:t>
+              <a:t>6/28/2021</a:t>
             </a:fld>
             <a:endParaRPr lang="en-US"/>
           </a:p>
@@ -8888,7 +8888,7 @@
           <a:p>
             <a:fld id="{044029A6-CD3A-492B-AB46-43FBF5BF89AA}" type="datetimeFigureOut">
               <a:rPr lang="en-US" smtClean="0"/>
-              <a:t>6/27/2021</a:t>
+              <a:t>6/28/2021</a:t>
             </a:fld>
             <a:endParaRPr lang="en-US"/>
           </a:p>
@@ -9129,7 +9129,7 @@
           <a:p>
             <a:fld id="{044029A6-CD3A-492B-AB46-43FBF5BF89AA}" type="datetimeFigureOut">
               <a:rPr lang="en-US" smtClean="0"/>
-              <a:t>6/27/2021</a:t>
+              <a:t>6/28/2021</a:t>
             </a:fld>
             <a:endParaRPr lang="en-US"/>
           </a:p>
@@ -22467,10 +22467,9 @@
           <a:lstStyle/>
           <a:p>
             <a:r>
-              <a:rPr lang="en-US"/>
+              <a:rPr lang="en-US" dirty="0"/>
               <a:t>Conclusion</a:t>
             </a:r>
-            <a:endParaRPr lang="en-US" dirty="0"/>
           </a:p>
         </p:txBody>
       </p:sp>
@@ -22503,23 +22502,23 @@
           <a:lstStyle/>
           <a:p>
             <a:r>
-              <a:rPr lang="en-US" sz="2400"/>
+              <a:rPr lang="en-US" sz="2400" dirty="0"/>
               <a:t>Sexually transmitted diseases(STDs) affect people of all ages, backgrounds, and ethnicities. In the U.S. alone there are about </a:t>
             </a:r>
             <a:r>
-              <a:rPr lang="en-US" sz="2400" b="1"/>
+              <a:rPr lang="en-US" sz="2400" b="1" dirty="0"/>
               <a:t>20 million new cases each year</a:t>
             </a:r>
           </a:p>
           <a:p>
             <a:r>
-              <a:rPr lang="en-US" sz="2400"/>
-              <a:t>Getting the facts about STIs and sexual health is increasingly important.</a:t>
+              <a:rPr lang="en-US" sz="2400" dirty="0"/>
+              <a:t>Getting the facts about STDs and sexual health is increasingly important.</a:t>
             </a:r>
           </a:p>
           <a:p>
             <a:r>
-              <a:rPr lang="en-US" sz="2400"/>
+              <a:rPr lang="en-US" sz="2400" dirty="0"/>
               <a:t>For good health and now the Health Department in California is working with the Department of Education to help educate kids in schools early on about STD prevention in Los Angeles.</a:t>
             </a:r>
           </a:p>

</xml_diff>

<commit_message>
made all the correction suggested and ready for the final presentation or Demo
</commit_message>
<xml_diff>
--- a/STD Infection in USA capstone.pptx
+++ b/STD Infection in USA capstone.pptx
@@ -20096,19 +20096,19 @@
         </p:nvSpPr>
         <p:spPr>
           <a:xfrm>
-            <a:off x="838199" y="1120676"/>
-            <a:ext cx="7021513" cy="2308324"/>
+            <a:off x="838199" y="252702"/>
+            <a:ext cx="7021513" cy="923331"/>
           </a:xfrm>
         </p:spPr>
         <p:txBody>
           <a:bodyPr>
-            <a:normAutofit/>
+            <a:normAutofit fontScale="90000"/>
           </a:bodyPr>
           <a:lstStyle/>
           <a:p>
             <a:pPr algn="l"/>
             <a:r>
-              <a:rPr lang="en-US" sz="7200">
+              <a:rPr lang="en-US" sz="7200" dirty="0">
                 <a:solidFill>
                   <a:schemeClr val="bg1"/>
                 </a:solidFill>
@@ -20118,6 +20118,149 @@
           </a:p>
         </p:txBody>
       </p:sp>
+      <p:sp>
+        <p:nvSpPr>
+          <p:cNvPr id="16" name="TextBox 15">
+            <a:extLst>
+              <a:ext uri="{FF2B5EF4-FFF2-40B4-BE49-F238E27FC236}">
+                <a16:creationId xmlns:a16="http://schemas.microsoft.com/office/drawing/2014/main" id="{BFE80C9A-6368-4A0D-8F02-5C89A44445DB}"/>
+              </a:ext>
+            </a:extLst>
+          </p:cNvPr>
+          <p:cNvSpPr txBox="1"/>
+          <p:nvPr/>
+        </p:nvSpPr>
+        <p:spPr>
+          <a:xfrm>
+            <a:off x="5126806" y="2908856"/>
+            <a:ext cx="6355644" cy="923330"/>
+          </a:xfrm>
+          <a:prstGeom prst="rect">
+            <a:avLst/>
+          </a:prstGeom>
+          <a:noFill/>
+        </p:spPr>
+        <p:txBody>
+          <a:bodyPr wrap="square">
+            <a:spAutoFit/>
+          </a:bodyPr>
+          <a:lstStyle/>
+          <a:p>
+            <a:r>
+              <a:rPr lang="en-US" dirty="0"/>
+              <a:t>https://www.who.int/images/default-source/imported/adolescents-stis-hiv-kenya.tmb-768v.jpg?Culture=en&amp;sfvrsn=c694ed63_38</a:t>
+            </a:r>
+          </a:p>
+        </p:txBody>
+      </p:sp>
+      <p:pic>
+        <p:nvPicPr>
+          <p:cNvPr id="20" name="Picture 19" descr="Text&#10;&#10;Description automatically generated with low confidence">
+            <a:extLst>
+              <a:ext uri="{FF2B5EF4-FFF2-40B4-BE49-F238E27FC236}">
+                <a16:creationId xmlns:a16="http://schemas.microsoft.com/office/drawing/2014/main" id="{E4A0333E-F73C-477F-8343-AD0D5F0CB73C}"/>
+              </a:ext>
+            </a:extLst>
+          </p:cNvPr>
+          <p:cNvPicPr>
+            <a:picLocks noChangeAspect="1"/>
+          </p:cNvPicPr>
+          <p:nvPr/>
+        </p:nvPicPr>
+        <p:blipFill>
+          <a:blip r:embed="rId3">
+            <a:extLst>
+              <a:ext uri="{28A0092B-C50C-407E-A947-70E740481C1C}">
+                <a14:useLocalDpi xmlns:a14="http://schemas.microsoft.com/office/drawing/2010/main" val="0"/>
+              </a:ext>
+            </a:extLst>
+          </a:blip>
+          <a:stretch>
+            <a:fillRect/>
+          </a:stretch>
+        </p:blipFill>
+        <p:spPr>
+          <a:xfrm>
+            <a:off x="8229600" y="1833562"/>
+            <a:ext cx="3474720" cy="3190876"/>
+          </a:xfrm>
+          <a:prstGeom prst="rect">
+            <a:avLst/>
+          </a:prstGeom>
+        </p:spPr>
+      </p:pic>
+      <p:pic>
+        <p:nvPicPr>
+          <p:cNvPr id="24" name="Picture 23">
+            <a:extLst>
+              <a:ext uri="{FF2B5EF4-FFF2-40B4-BE49-F238E27FC236}">
+                <a16:creationId xmlns:a16="http://schemas.microsoft.com/office/drawing/2014/main" id="{79D0C3BC-8158-4D21-B657-09024B8D82D0}"/>
+              </a:ext>
+            </a:extLst>
+          </p:cNvPr>
+          <p:cNvPicPr>
+            <a:picLocks noChangeAspect="1"/>
+          </p:cNvPicPr>
+          <p:nvPr/>
+        </p:nvPicPr>
+        <p:blipFill>
+          <a:blip r:embed="rId4">
+            <a:extLst>
+              <a:ext uri="{28A0092B-C50C-407E-A947-70E740481C1C}">
+                <a14:useLocalDpi xmlns:a14="http://schemas.microsoft.com/office/drawing/2010/main" val="0"/>
+              </a:ext>
+            </a:extLst>
+          </a:blip>
+          <a:stretch>
+            <a:fillRect/>
+          </a:stretch>
+        </p:blipFill>
+        <p:spPr>
+          <a:xfrm>
+            <a:off x="4417254" y="1879935"/>
+            <a:ext cx="3324665" cy="3190876"/>
+          </a:xfrm>
+          <a:prstGeom prst="rect">
+            <a:avLst/>
+          </a:prstGeom>
+        </p:spPr>
+      </p:pic>
+      <p:pic>
+        <p:nvPicPr>
+          <p:cNvPr id="26" name="Picture 25" descr="A picture containing food&#10;&#10;Description automatically generated">
+            <a:extLst>
+              <a:ext uri="{FF2B5EF4-FFF2-40B4-BE49-F238E27FC236}">
+                <a16:creationId xmlns:a16="http://schemas.microsoft.com/office/drawing/2014/main" id="{D09E7281-48D8-4748-9C75-F6CC831CFEAD}"/>
+              </a:ext>
+            </a:extLst>
+          </p:cNvPr>
+          <p:cNvPicPr>
+            <a:picLocks noChangeAspect="1"/>
+          </p:cNvPicPr>
+          <p:nvPr/>
+        </p:nvPicPr>
+        <p:blipFill>
+          <a:blip r:embed="rId5">
+            <a:extLst>
+              <a:ext uri="{28A0092B-C50C-407E-A947-70E740481C1C}">
+                <a14:useLocalDpi xmlns:a14="http://schemas.microsoft.com/office/drawing/2010/main" val="0"/>
+              </a:ext>
+            </a:extLst>
+          </a:blip>
+          <a:stretch>
+            <a:fillRect/>
+          </a:stretch>
+        </p:blipFill>
+        <p:spPr>
+          <a:xfrm>
+            <a:off x="454854" y="1879935"/>
+            <a:ext cx="3474720" cy="3190876"/>
+          </a:xfrm>
+          <a:prstGeom prst="rect">
+            <a:avLst/>
+          </a:prstGeom>
+        </p:spPr>
+      </p:pic>
     </p:spTree>
     <p:extLst>
       <p:ext uri="{BB962C8B-B14F-4D97-AF65-F5344CB8AC3E}">
@@ -21627,7 +21770,7 @@
         </p:spPr>
         <p:txBody>
           <a:bodyPr anchor="t">
-            <a:normAutofit/>
+            <a:normAutofit fontScale="92500" lnSpcReduction="10000"/>
           </a:bodyPr>
           <a:lstStyle/>
           <a:p>
@@ -21635,7 +21778,7 @@
               <a:buNone/>
             </a:pPr>
             <a:r>
-              <a:rPr lang="en-US" sz="2000" b="1"/>
+              <a:rPr lang="en-US" sz="2000" b="1" dirty="0"/>
               <a:t>Factors affecting the rise of STDs</a:t>
             </a:r>
           </a:p>
@@ -21643,24 +21786,24 @@
             <a:pPr marL="0" lvl="0" indent="0">
               <a:buNone/>
             </a:pPr>
-            <a:endParaRPr lang="en-US" sz="2000" b="1"/>
+            <a:endParaRPr lang="en-US" sz="2000" b="1" dirty="0"/>
           </a:p>
           <a:p>
             <a:pPr marL="0" lvl="0" indent="0">
               <a:buNone/>
             </a:pPr>
             <a:r>
-              <a:rPr lang="en-US" sz="2000"/>
+              <a:rPr lang="en-US" sz="2000" dirty="0"/>
               <a:t>* Doctors are pointing to several factors as the reason for the vast increase in sexually transmitted diseases (STDs).</a:t>
             </a:r>
-            <a:endParaRPr lang="en-US" sz="2000" b="1"/>
+            <a:endParaRPr lang="en-US" sz="2000" b="1" dirty="0"/>
           </a:p>
           <a:p>
             <a:pPr marL="0" lvl="0" indent="0">
               <a:buNone/>
             </a:pPr>
             <a:r>
-              <a:rPr lang="en-US" sz="2000"/>
+              <a:rPr lang="en-US" sz="2000" dirty="0"/>
               <a:t>	-Apps like tinder which makes 26 million matches 1.5 million 	    	   dates a week</a:t>
             </a:r>
           </a:p>
@@ -21669,7 +21812,7 @@
               <a:buNone/>
             </a:pPr>
             <a:r>
-              <a:rPr lang="en-US" sz="2000"/>
+              <a:rPr lang="en-US" sz="2000" dirty="0"/>
               <a:t>	-Gay dating apps like Grindr has been increasingly allowing </a:t>
             </a:r>
           </a:p>
@@ -21678,7 +21821,7 @@
               <a:buNone/>
             </a:pPr>
             <a:r>
-              <a:rPr lang="en-US" sz="2000"/>
+              <a:rPr lang="en-US" sz="2000" dirty="0"/>
               <a:t>	   people to indicate STD information.</a:t>
             </a:r>
           </a:p>
@@ -21687,8 +21830,15 @@
               <a:buNone/>
             </a:pPr>
             <a:r>
-              <a:rPr lang="en-US" sz="2000"/>
+              <a:rPr lang="en-US" sz="2000" dirty="0"/>
               <a:t>      </a:t>
+            </a:r>
+          </a:p>
+          <a:p>
+            <a:pPr lvl="0"/>
+            <a:r>
+              <a:rPr lang="en-US" sz="2000" dirty="0"/>
+              <a:t>Health professionals point to closures of smaller clinics as part of the reason for the rise in STDs</a:t>
             </a:r>
           </a:p>
           <a:p>
@@ -21696,12 +21846,25 @@
               <a:buNone/>
             </a:pPr>
             <a:r>
-              <a:rPr lang="en-US" sz="2000"/>
-              <a:t>* Health professionals point to closures of smaller clinics as part of the reason for the rise in STDs</a:t>
+              <a:rPr lang="en-US" sz="2000" dirty="0"/>
+              <a:t>  Ref . </a:t>
             </a:r>
+            <a:r>
+              <a:rPr lang="en-US" sz="2000" dirty="0">
+                <a:hlinkClick r:id="rId2"/>
+              </a:rPr>
+              <a:t>https://www.cdc.gov/std/program/data-mgmt.htm</a:t>
+            </a:r>
+            <a:endParaRPr lang="en-US" sz="2000" dirty="0"/>
           </a:p>
           <a:p>
-            <a:endParaRPr lang="en-US" sz="2000"/>
+            <a:pPr marL="0" lvl="0" indent="0">
+              <a:buNone/>
+            </a:pPr>
+            <a:endParaRPr lang="en-US" sz="2000" dirty="0"/>
+          </a:p>
+          <a:p>
+            <a:endParaRPr lang="en-US" sz="2000" dirty="0"/>
           </a:p>
         </p:txBody>
       </p:sp>
@@ -22492,7 +22655,7 @@
         <p:spPr>
           <a:xfrm>
             <a:off x="838198" y="1956390"/>
-            <a:ext cx="7322290" cy="3907465"/>
+            <a:ext cx="7322290" cy="2807521"/>
           </a:xfrm>
         </p:spPr>
         <p:txBody>
@@ -22513,13 +22676,13 @@
           <a:p>
             <a:r>
               <a:rPr lang="en-US" sz="2400" dirty="0"/>
-              <a:t>Getting the facts about STDs and sexual health is increasingly important.</a:t>
+              <a:t>Chlamydia is the highest and most common STD in USA</a:t>
             </a:r>
           </a:p>
           <a:p>
             <a:r>
               <a:rPr lang="en-US" sz="2400" dirty="0"/>
-              <a:t>For good health and now the Health Department in California is working with the Department of Education to help educate kids in schools early on about STD prevention in Los Angeles.</a:t>
+              <a:t>STDs infection rate is high between the age of 15-24 so to protect the prevention its better to educate kids in their early adolescent age .</a:t>
             </a:r>
           </a:p>
         </p:txBody>

</xml_diff>